<commit_message>
Touch-ups on the Presentation Doc
</commit_message>
<xml_diff>
--- a/MSA-Assessment-Deck.pptx
+++ b/MSA-Assessment-Deck.pptx
@@ -5,19 +5,22 @@
     <p:sldMasterId id="2147483648" r:id="rId1"/>
   </p:sldMasterIdLst>
   <p:notesMasterIdLst>
-    <p:notesMasterId r:id="rId12"/>
+    <p:notesMasterId r:id="rId15"/>
   </p:notesMasterIdLst>
   <p:sldIdLst>
     <p:sldId id="266" r:id="rId2"/>
     <p:sldId id="256" r:id="rId3"/>
-    <p:sldId id="257" r:id="rId4"/>
+    <p:sldId id="268" r:id="rId4"/>
     <p:sldId id="263" r:id="rId5"/>
     <p:sldId id="258" r:id="rId6"/>
     <p:sldId id="265" r:id="rId7"/>
     <p:sldId id="260" r:id="rId8"/>
     <p:sldId id="261" r:id="rId9"/>
     <p:sldId id="264" r:id="rId10"/>
-    <p:sldId id="262" r:id="rId11"/>
+    <p:sldId id="267" r:id="rId11"/>
+    <p:sldId id="270" r:id="rId12"/>
+    <p:sldId id="269" r:id="rId13"/>
+    <p:sldId id="262" r:id="rId14"/>
   </p:sldIdLst>
   <p:sldSz cx="12192000" cy="6858000"/>
   <p:notesSz cx="6858000" cy="9144000"/>
@@ -206,7 +209,7 @@
           <a:p>
             <a:fld id="{9FB5EA18-F66C-4D75-8C80-0C1A1E868DE6}" type="datetimeFigureOut">
               <a:rPr lang="en-US" smtClean="0"/>
-              <a:t>11/21/18</a:t>
+              <a:t>11/23/18</a:t>
             </a:fld>
             <a:endParaRPr lang="en-US"/>
           </a:p>
@@ -565,6 +568,98 @@
 </p:notes>
 </file>
 
+<file path=ppt/notesSlides/notesSlide10.xml><?xml version="1.0" encoding="utf-8"?>
+<p:notes xmlns:a="http://schemas.openxmlformats.org/drawingml/2006/main" xmlns:r="http://schemas.openxmlformats.org/officeDocument/2006/relationships" xmlns:p="http://schemas.openxmlformats.org/presentationml/2006/main">
+  <p:cSld>
+    <p:spTree>
+      <p:nvGrpSpPr>
+        <p:cNvPr id="1" name=""/>
+        <p:cNvGrpSpPr/>
+        <p:nvPr/>
+      </p:nvGrpSpPr>
+      <p:grpSpPr>
+        <a:xfrm>
+          <a:off x="0" y="0"/>
+          <a:ext cx="0" cy="0"/>
+          <a:chOff x="0" y="0"/>
+          <a:chExt cx="0" cy="0"/>
+        </a:xfrm>
+      </p:grpSpPr>
+      <p:sp>
+        <p:nvSpPr>
+          <p:cNvPr id="2" name="Slide Image Placeholder 1"/>
+          <p:cNvSpPr>
+            <a:spLocks noGrp="1" noRot="1" noChangeAspect="1"/>
+          </p:cNvSpPr>
+          <p:nvPr>
+            <p:ph type="sldImg"/>
+          </p:nvPr>
+        </p:nvSpPr>
+        <p:spPr/>
+      </p:sp>
+      <p:sp>
+        <p:nvSpPr>
+          <p:cNvPr id="3" name="Notes Placeholder 2"/>
+          <p:cNvSpPr>
+            <a:spLocks noGrp="1"/>
+          </p:cNvSpPr>
+          <p:nvPr>
+            <p:ph type="body" idx="1"/>
+          </p:nvPr>
+        </p:nvSpPr>
+        <p:spPr/>
+        <p:txBody>
+          <a:bodyPr/>
+          <a:lstStyle/>
+          <a:p>
+            <a:r>
+              <a:rPr lang="en-US" dirty="0"/>
+              <a:t>Any final</a:t>
+            </a:r>
+            <a:r>
+              <a:rPr lang="en-US" baseline="0" dirty="0"/>
+              <a:t> things you want to tell us</a:t>
+            </a:r>
+            <a:endParaRPr lang="en-US" dirty="0"/>
+          </a:p>
+        </p:txBody>
+      </p:sp>
+      <p:sp>
+        <p:nvSpPr>
+          <p:cNvPr id="4" name="Slide Number Placeholder 3"/>
+          <p:cNvSpPr>
+            <a:spLocks noGrp="1"/>
+          </p:cNvSpPr>
+          <p:nvPr>
+            <p:ph type="sldNum" sz="quarter" idx="10"/>
+          </p:nvPr>
+        </p:nvSpPr>
+        <p:spPr/>
+        <p:txBody>
+          <a:bodyPr/>
+          <a:lstStyle/>
+          <a:p>
+            <a:fld id="{A008DDF4-253B-4E36-BE28-46B8E6426B7B}" type="slidenum">
+              <a:rPr lang="en-US" smtClean="0"/>
+              <a:t>13</a:t>
+            </a:fld>
+            <a:endParaRPr lang="en-US"/>
+          </a:p>
+        </p:txBody>
+      </p:sp>
+    </p:spTree>
+    <p:extLst>
+      <p:ext uri="{BB962C8B-B14F-4D97-AF65-F5344CB8AC3E}">
+        <p14:creationId xmlns:p14="http://schemas.microsoft.com/office/powerpoint/2010/main" val="3392905823"/>
+      </p:ext>
+    </p:extLst>
+  </p:cSld>
+  <p:clrMapOvr>
+    <a:masterClrMapping/>
+  </p:clrMapOvr>
+</p:notes>
+</file>
+
 <file path=ppt/notesSlides/notesSlide2.xml><?xml version="1.0" encoding="utf-8"?>
 <p:notes xmlns:a="http://schemas.openxmlformats.org/drawingml/2006/main" xmlns:r="http://schemas.openxmlformats.org/officeDocument/2006/relationships" xmlns:p="http://schemas.openxmlformats.org/presentationml/2006/main">
   <p:cSld>
@@ -653,7 +748,7 @@
     </p:spTree>
     <p:extLst>
       <p:ext uri="{BB962C8B-B14F-4D97-AF65-F5344CB8AC3E}">
-        <p14:creationId xmlns:p14="http://schemas.microsoft.com/office/powerpoint/2010/main" val="3078341078"/>
+        <p14:creationId xmlns:p14="http://schemas.microsoft.com/office/powerpoint/2010/main" val="496882717"/>
       </p:ext>
     </p:extLst>
   </p:cSld>
@@ -796,8 +891,23 @@
           <a:p>
             <a:r>
               <a:rPr lang="en-US" dirty="0"/>
-              <a:t>Talk about your database, what schema you used and what data you used</a:t>
-            </a:r>
+              <a:t>Talk about your database, what schema you used and what data you </a:t>
+            </a:r>
+            <a:r>
+              <a:rPr lang="en-US" dirty="0" smtClean="0"/>
+              <a:t>used</a:t>
+            </a:r>
+          </a:p>
+          <a:p>
+            <a:r>
+              <a:rPr lang="en-US" dirty="0" smtClean="0"/>
+              <a:t>Swagger UI asset</a:t>
+            </a:r>
+            <a:r>
+              <a:rPr lang="en-US" baseline="0" dirty="0" smtClean="0"/>
+              <a:t> to render the database</a:t>
+            </a:r>
+            <a:endParaRPr lang="en-US" dirty="0"/>
           </a:p>
         </p:txBody>
       </p:sp>
@@ -1246,11 +1356,11 @@
           <a:p>
             <a:r>
               <a:rPr lang="en-US" dirty="0"/>
-              <a:t>Any final</a:t>
+              <a:t>Advanced</a:t>
             </a:r>
             <a:r>
               <a:rPr lang="en-US" baseline="0" dirty="0"/>
-              <a:t> things you want to tell us</a:t>
+              <a:t> considerations…</a:t>
             </a:r>
             <a:endParaRPr lang="en-US" dirty="0"/>
           </a:p>
@@ -1282,7 +1392,7 @@
     </p:spTree>
     <p:extLst>
       <p:ext uri="{BB962C8B-B14F-4D97-AF65-F5344CB8AC3E}">
-        <p14:creationId xmlns:p14="http://schemas.microsoft.com/office/powerpoint/2010/main" val="3392905823"/>
+        <p14:creationId xmlns:p14="http://schemas.microsoft.com/office/powerpoint/2010/main" val="2027253806"/>
       </p:ext>
     </p:extLst>
   </p:cSld>
@@ -1427,7 +1537,7 @@
           <a:p>
             <a:fld id="{4BFC623A-4806-45FB-9E07-894B153158FF}" type="datetimeFigureOut">
               <a:rPr lang="en-US" smtClean="0"/>
-              <a:t>11/21/18</a:t>
+              <a:t>11/23/18</a:t>
             </a:fld>
             <a:endParaRPr lang="en-US"/>
           </a:p>
@@ -1633,7 +1743,7 @@
           <a:p>
             <a:fld id="{4BFC623A-4806-45FB-9E07-894B153158FF}" type="datetimeFigureOut">
               <a:rPr lang="en-US" smtClean="0"/>
-              <a:t>11/21/18</a:t>
+              <a:t>11/23/18</a:t>
             </a:fld>
             <a:endParaRPr lang="en-US"/>
           </a:p>
@@ -1883,7 +1993,7 @@
           <a:p>
             <a:fld id="{4BFC623A-4806-45FB-9E07-894B153158FF}" type="datetimeFigureOut">
               <a:rPr lang="en-US" smtClean="0"/>
-              <a:t>11/21/18</a:t>
+              <a:t>11/23/18</a:t>
             </a:fld>
             <a:endParaRPr lang="en-US"/>
           </a:p>
@@ -2119,7 +2229,7 @@
           <a:p>
             <a:fld id="{4BFC623A-4806-45FB-9E07-894B153158FF}" type="datetimeFigureOut">
               <a:rPr lang="en-US" smtClean="0"/>
-              <a:t>11/21/18</a:t>
+              <a:t>11/23/18</a:t>
             </a:fld>
             <a:endParaRPr lang="en-US"/>
           </a:p>
@@ -2236,7 +2346,7 @@
           <a:p>
             <a:fld id="{4BFC623A-4806-45FB-9E07-894B153158FF}" type="datetimeFigureOut">
               <a:rPr lang="en-US" smtClean="0"/>
-              <a:t>11/21/18</a:t>
+              <a:t>11/23/18</a:t>
             </a:fld>
             <a:endParaRPr lang="en-US"/>
           </a:p>
@@ -2341,7 +2451,7 @@
           <a:p>
             <a:fld id="{4BFC623A-4806-45FB-9E07-894B153158FF}" type="datetimeFigureOut">
               <a:rPr lang="en-US" smtClean="0"/>
-              <a:t>11/21/18</a:t>
+              <a:t>11/23/18</a:t>
             </a:fld>
             <a:endParaRPr lang="en-US"/>
           </a:p>
@@ -2626,7 +2736,7 @@
           <a:p>
             <a:fld id="{4BFC623A-4806-45FB-9E07-894B153158FF}" type="datetimeFigureOut">
               <a:rPr lang="en-US" smtClean="0"/>
-              <a:t>11/21/18</a:t>
+              <a:t>11/23/18</a:t>
             </a:fld>
             <a:endParaRPr lang="en-US"/>
           </a:p>
@@ -2850,7 +2960,7 @@
           <a:p>
             <a:fld id="{4BFC623A-4806-45FB-9E07-894B153158FF}" type="datetimeFigureOut">
               <a:rPr lang="en-US" smtClean="0"/>
-              <a:t>11/21/18</a:t>
+              <a:t>11/23/18</a:t>
             </a:fld>
             <a:endParaRPr lang="en-US"/>
           </a:p>
@@ -2939,7 +3049,7 @@
           <p:cNvPr id="7" name="Rectangle 6">
             <a:extLst>
               <a:ext uri="{FF2B5EF4-FFF2-40B4-BE49-F238E27FC236}">
-                <a16:creationId xmlns:a16="http://schemas.microsoft.com/office/drawing/2014/main" id="{04B4CCE6-4A64-4B17-B79A-DBEE836B49F4}"/>
+                <a16:creationId xmlns:a16="http://schemas.microsoft.com/office/drawing/2014/main" xmlns="" id="{04B4CCE6-4A64-4B17-B79A-DBEE836B49F4}"/>
               </a:ext>
             </a:extLst>
           </p:cNvPr>
@@ -2991,7 +3101,7 @@
           <p:cNvPr id="9" name="Picture 8">
             <a:extLst>
               <a:ext uri="{FF2B5EF4-FFF2-40B4-BE49-F238E27FC236}">
-                <a16:creationId xmlns:a16="http://schemas.microsoft.com/office/drawing/2014/main" id="{B64D312E-500D-437B-B3BC-D1C116C4385F}"/>
+                <a16:creationId xmlns:a16="http://schemas.microsoft.com/office/drawing/2014/main" xmlns="" id="{B64D312E-500D-437B-B3BC-D1C116C4385F}"/>
               </a:ext>
             </a:extLst>
           </p:cNvPr>
@@ -3027,7 +3137,7 @@
           <p:cNvPr id="10" name="TextBox 9">
             <a:extLst>
               <a:ext uri="{FF2B5EF4-FFF2-40B4-BE49-F238E27FC236}">
-                <a16:creationId xmlns:a16="http://schemas.microsoft.com/office/drawing/2014/main" id="{EC283049-03AB-4647-B58F-EF370055FF9C}"/>
+                <a16:creationId xmlns:a16="http://schemas.microsoft.com/office/drawing/2014/main" xmlns="" id="{EC283049-03AB-4647-B58F-EF370055FF9C}"/>
               </a:ext>
             </a:extLst>
           </p:cNvPr>
@@ -3494,12 +3604,348 @@
           <a:lstStyle/>
           <a:p>
             <a:r>
-              <a:rPr lang="en-US" dirty="0">
-                <a:latin typeface="Segoe UI Light" panose="020B0502040204020203" pitchFamily="34" charset="0"/>
-                <a:cs typeface="Segoe UI Light" panose="020B0502040204020203" pitchFamily="34" charset="0"/>
+              <a:rPr lang="en-US" dirty="0" smtClean="0">
+                <a:latin typeface="Roboto Light" charset="0"/>
+                <a:ea typeface="Roboto Light" charset="0"/>
+                <a:cs typeface="Roboto Light" charset="0"/>
+              </a:rPr>
+              <a:t>Challenges/Problems</a:t>
+            </a:r>
+            <a:endParaRPr lang="en-US" dirty="0">
+              <a:latin typeface="Roboto Light" charset="0"/>
+              <a:ea typeface="Roboto Light" charset="0"/>
+              <a:cs typeface="Roboto Light" charset="0"/>
+            </a:endParaRPr>
+          </a:p>
+        </p:txBody>
+      </p:sp>
+      <p:sp>
+        <p:nvSpPr>
+          <p:cNvPr id="3" name="Subtitle 2"/>
+          <p:cNvSpPr>
+            <a:spLocks noGrp="1"/>
+          </p:cNvSpPr>
+          <p:nvPr>
+            <p:ph idx="1"/>
+          </p:nvPr>
+        </p:nvSpPr>
+        <p:spPr/>
+        <p:txBody>
+          <a:bodyPr/>
+          <a:lstStyle/>
+          <a:p>
+            <a:r>
+              <a:rPr lang="en-US" dirty="0" smtClean="0">
+                <a:latin typeface="Roboto Light" charset="0"/>
+                <a:ea typeface="Roboto Light" charset="0"/>
+                <a:cs typeface="Roboto Light" charset="0"/>
+              </a:rPr>
+              <a:t>Time pressure</a:t>
+            </a:r>
+          </a:p>
+          <a:p>
+            <a:r>
+              <a:rPr lang="en-US" dirty="0" smtClean="0">
+                <a:latin typeface="Roboto Light" charset="0"/>
+                <a:ea typeface="Roboto Light" charset="0"/>
+                <a:cs typeface="Roboto Light" charset="0"/>
+              </a:rPr>
+              <a:t>New environment</a:t>
+            </a:r>
+          </a:p>
+          <a:p>
+            <a:r>
+              <a:rPr lang="en-US" dirty="0" smtClean="0">
+                <a:latin typeface="Roboto Light" charset="0"/>
+                <a:ea typeface="Roboto Light" charset="0"/>
+                <a:cs typeface="Roboto Light" charset="0"/>
+              </a:rPr>
+              <a:t>Microphone and Camera concurrency issue</a:t>
+            </a:r>
+            <a:endParaRPr lang="en-US" dirty="0" smtClean="0">
+              <a:latin typeface="Roboto Light" charset="0"/>
+              <a:ea typeface="Roboto Light" charset="0"/>
+              <a:cs typeface="Roboto Light" charset="0"/>
+            </a:endParaRPr>
+          </a:p>
+          <a:p>
+            <a:endParaRPr lang="en-US" dirty="0" smtClean="0">
+              <a:latin typeface="Roboto Light" charset="0"/>
+              <a:ea typeface="Roboto Light" charset="0"/>
+              <a:cs typeface="Roboto Light" charset="0"/>
+            </a:endParaRPr>
+          </a:p>
+        </p:txBody>
+      </p:sp>
+    </p:spTree>
+    <p:extLst>
+      <p:ext uri="{BB962C8B-B14F-4D97-AF65-F5344CB8AC3E}">
+        <p14:creationId xmlns:p14="http://schemas.microsoft.com/office/powerpoint/2010/main" val="2058546368"/>
+      </p:ext>
+    </p:extLst>
+  </p:cSld>
+  <p:clrMapOvr>
+    <a:masterClrMapping/>
+  </p:clrMapOvr>
+</p:sld>
+</file>
+
+<file path=ppt/slides/slide11.xml><?xml version="1.0" encoding="utf-8"?>
+<p:sld xmlns:a="http://schemas.openxmlformats.org/drawingml/2006/main" xmlns:r="http://schemas.openxmlformats.org/officeDocument/2006/relationships" xmlns:p="http://schemas.openxmlformats.org/presentationml/2006/main">
+  <p:cSld>
+    <p:spTree>
+      <p:nvGrpSpPr>
+        <p:cNvPr id="1" name=""/>
+        <p:cNvGrpSpPr/>
+        <p:nvPr/>
+      </p:nvGrpSpPr>
+      <p:grpSpPr>
+        <a:xfrm>
+          <a:off x="0" y="0"/>
+          <a:ext cx="0" cy="0"/>
+          <a:chOff x="0" y="0"/>
+          <a:chExt cx="0" cy="0"/>
+        </a:xfrm>
+      </p:grpSpPr>
+      <p:sp>
+        <p:nvSpPr>
+          <p:cNvPr id="2" name="Title 1"/>
+          <p:cNvSpPr>
+            <a:spLocks noGrp="1"/>
+          </p:cNvSpPr>
+          <p:nvPr>
+            <p:ph type="title"/>
+          </p:nvPr>
+        </p:nvSpPr>
+        <p:spPr/>
+        <p:txBody>
+          <a:bodyPr/>
+          <a:lstStyle/>
+          <a:p>
+            <a:r>
+              <a:rPr lang="en-US" dirty="0" smtClean="0">
+                <a:latin typeface="Roboto Light" charset="0"/>
+                <a:ea typeface="Roboto Light" charset="0"/>
+                <a:cs typeface="Roboto Light" charset="0"/>
+              </a:rPr>
+              <a:t>Improvements required</a:t>
+            </a:r>
+            <a:endParaRPr lang="en-US" dirty="0">
+              <a:latin typeface="Roboto Light" charset="0"/>
+              <a:ea typeface="Roboto Light" charset="0"/>
+              <a:cs typeface="Roboto Light" charset="0"/>
+            </a:endParaRPr>
+          </a:p>
+        </p:txBody>
+      </p:sp>
+      <p:sp>
+        <p:nvSpPr>
+          <p:cNvPr id="3" name="Content Placeholder 2"/>
+          <p:cNvSpPr>
+            <a:spLocks noGrp="1"/>
+          </p:cNvSpPr>
+          <p:nvPr>
+            <p:ph idx="1"/>
+          </p:nvPr>
+        </p:nvSpPr>
+        <p:spPr/>
+        <p:txBody>
+          <a:bodyPr/>
+          <a:lstStyle/>
+          <a:p>
+            <a:r>
+              <a:rPr lang="en-US" dirty="0" smtClean="0">
+                <a:latin typeface="+mj-lt"/>
+              </a:rPr>
+              <a:t>Better model</a:t>
+            </a:r>
+          </a:p>
+          <a:p>
+            <a:r>
+              <a:rPr lang="en-US" dirty="0" smtClean="0">
+                <a:latin typeface="+mj-lt"/>
+              </a:rPr>
+              <a:t>Different layout</a:t>
+            </a:r>
+          </a:p>
+          <a:p>
+            <a:r>
+              <a:rPr lang="en-US" dirty="0" smtClean="0">
+                <a:latin typeface="+mj-lt"/>
+              </a:rPr>
+              <a:t>More use of Material-UI</a:t>
+            </a:r>
+          </a:p>
+          <a:p>
+            <a:r>
+              <a:rPr lang="en-US" dirty="0" smtClean="0">
+                <a:latin typeface="+mj-lt"/>
+              </a:rPr>
+              <a:t>Refactor code and adopt Test-driven Development</a:t>
+            </a:r>
+          </a:p>
+          <a:p>
+            <a:endParaRPr lang="en-US" dirty="0" smtClean="0">
+              <a:latin typeface="+mj-lt"/>
+            </a:endParaRPr>
+          </a:p>
+        </p:txBody>
+      </p:sp>
+    </p:spTree>
+    <p:extLst>
+      <p:ext uri="{BB962C8B-B14F-4D97-AF65-F5344CB8AC3E}">
+        <p14:creationId xmlns:p14="http://schemas.microsoft.com/office/powerpoint/2010/main" val="553022588"/>
+      </p:ext>
+    </p:extLst>
+  </p:cSld>
+  <p:clrMapOvr>
+    <a:masterClrMapping/>
+  </p:clrMapOvr>
+</p:sld>
+</file>
+
+<file path=ppt/slides/slide12.xml><?xml version="1.0" encoding="utf-8"?>
+<p:sld xmlns:a="http://schemas.openxmlformats.org/drawingml/2006/main" xmlns:r="http://schemas.openxmlformats.org/officeDocument/2006/relationships" xmlns:p="http://schemas.openxmlformats.org/presentationml/2006/main">
+  <p:cSld>
+    <p:spTree>
+      <p:nvGrpSpPr>
+        <p:cNvPr id="1" name=""/>
+        <p:cNvGrpSpPr/>
+        <p:nvPr/>
+      </p:nvGrpSpPr>
+      <p:grpSpPr>
+        <a:xfrm>
+          <a:off x="0" y="0"/>
+          <a:ext cx="0" cy="0"/>
+          <a:chOff x="0" y="0"/>
+          <a:chExt cx="0" cy="0"/>
+        </a:xfrm>
+      </p:grpSpPr>
+      <p:sp>
+        <p:nvSpPr>
+          <p:cNvPr id="2" name="Title 1"/>
+          <p:cNvSpPr>
+            <a:spLocks noGrp="1"/>
+          </p:cNvSpPr>
+          <p:nvPr>
+            <p:ph type="title"/>
+          </p:nvPr>
+        </p:nvSpPr>
+        <p:spPr/>
+        <p:txBody>
+          <a:bodyPr/>
+          <a:lstStyle/>
+          <a:p>
+            <a:r>
+              <a:rPr lang="en-US" smtClean="0">
+                <a:latin typeface="Roboto Light" charset="0"/>
+                <a:ea typeface="Roboto Light" charset="0"/>
+                <a:cs typeface="Roboto Light" charset="0"/>
+              </a:rPr>
+              <a:t>Demonstration</a:t>
+            </a:r>
+            <a:endParaRPr lang="en-US" dirty="0">
+              <a:latin typeface="Roboto Light" charset="0"/>
+              <a:ea typeface="Roboto Light" charset="0"/>
+              <a:cs typeface="Roboto Light" charset="0"/>
+            </a:endParaRPr>
+          </a:p>
+        </p:txBody>
+      </p:sp>
+      <p:sp>
+        <p:nvSpPr>
+          <p:cNvPr id="3" name="Content Placeholder 2"/>
+          <p:cNvSpPr>
+            <a:spLocks noGrp="1"/>
+          </p:cNvSpPr>
+          <p:nvPr>
+            <p:ph idx="1"/>
+          </p:nvPr>
+        </p:nvSpPr>
+        <p:spPr/>
+        <p:txBody>
+          <a:bodyPr/>
+          <a:lstStyle/>
+          <a:p>
+            <a:pPr marL="0" marR="0" lvl="0" indent="0" defTabSz="914400" eaLnBrk="1" fontAlgn="auto" latinLnBrk="0" hangingPunct="1">
+              <a:lnSpc>
+                <a:spcPct val="100000"/>
+              </a:lnSpc>
+              <a:spcBef>
+                <a:spcPts val="0"/>
+              </a:spcBef>
+              <a:spcAft>
+                <a:spcPts val="0"/>
+              </a:spcAft>
+              <a:buClrTx/>
+              <a:buSzTx/>
+              <a:buFontTx/>
+              <a:buNone/>
+              <a:tabLst/>
+              <a:defRPr/>
+            </a:pPr>
+            <a:endParaRPr lang="en-US" dirty="0"/>
+          </a:p>
+        </p:txBody>
+      </p:sp>
+    </p:spTree>
+    <p:extLst>
+      <p:ext uri="{BB962C8B-B14F-4D97-AF65-F5344CB8AC3E}">
+        <p14:creationId xmlns:p14="http://schemas.microsoft.com/office/powerpoint/2010/main" val="622777857"/>
+      </p:ext>
+    </p:extLst>
+  </p:cSld>
+  <p:clrMapOvr>
+    <a:masterClrMapping/>
+  </p:clrMapOvr>
+</p:sld>
+</file>
+
+<file path=ppt/slides/slide13.xml><?xml version="1.0" encoding="utf-8"?>
+<p:sld xmlns:a="http://schemas.openxmlformats.org/drawingml/2006/main" xmlns:r="http://schemas.openxmlformats.org/officeDocument/2006/relationships" xmlns:p="http://schemas.openxmlformats.org/presentationml/2006/main">
+  <p:cSld>
+    <p:spTree>
+      <p:nvGrpSpPr>
+        <p:cNvPr id="1" name=""/>
+        <p:cNvGrpSpPr/>
+        <p:nvPr/>
+      </p:nvGrpSpPr>
+      <p:grpSpPr>
+        <a:xfrm>
+          <a:off x="0" y="0"/>
+          <a:ext cx="0" cy="0"/>
+          <a:chOff x="0" y="0"/>
+          <a:chExt cx="0" cy="0"/>
+        </a:xfrm>
+      </p:grpSpPr>
+      <p:sp>
+        <p:nvSpPr>
+          <p:cNvPr id="2" name="Title 1"/>
+          <p:cNvSpPr>
+            <a:spLocks noGrp="1"/>
+          </p:cNvSpPr>
+          <p:nvPr>
+            <p:ph type="title"/>
+          </p:nvPr>
+        </p:nvSpPr>
+        <p:spPr/>
+        <p:txBody>
+          <a:bodyPr/>
+          <a:lstStyle/>
+          <a:p>
+            <a:r>
+              <a:rPr lang="en-US" dirty="0" smtClean="0">
+                <a:latin typeface="Roboto Light" charset="0"/>
+                <a:ea typeface="Roboto Light" charset="0"/>
+                <a:cs typeface="Roboto Light" charset="0"/>
               </a:rPr>
               <a:t>Final Comments</a:t>
             </a:r>
+            <a:endParaRPr lang="en-US" dirty="0">
+              <a:latin typeface="Roboto Light" charset="0"/>
+              <a:ea typeface="Roboto Light" charset="0"/>
+              <a:cs typeface="Roboto Light" charset="0"/>
+            </a:endParaRPr>
           </a:p>
         </p:txBody>
       </p:sp>
@@ -3513,14 +3959,27 @@
             <p:ph idx="1"/>
           </p:nvPr>
         </p:nvSpPr>
-        <p:spPr/>
-        <p:txBody>
-          <a:bodyPr/>
-          <a:lstStyle/>
-          <a:p>
-            <a:pPr marL="0" indent="0">
+        <p:spPr>
+          <a:xfrm>
+            <a:off x="838200" y="3006671"/>
+            <a:ext cx="10515600" cy="3170292"/>
+          </a:xfrm>
+        </p:spPr>
+        <p:txBody>
+          <a:bodyPr/>
+          <a:lstStyle/>
+          <a:p>
+            <a:pPr marL="0" indent="0" algn="ctr">
               <a:buNone/>
             </a:pPr>
+            <a:r>
+              <a:rPr lang="en-US" dirty="0" smtClean="0">
+                <a:latin typeface="Roboto Thin" charset="0"/>
+                <a:ea typeface="Roboto Thin" charset="0"/>
+                <a:cs typeface="Roboto Thin" charset="0"/>
+              </a:rPr>
+              <a:t>Thank you MSA team for helping us through these exciting projects and for making them possible.</a:t>
+            </a:r>
             <a:endParaRPr lang="en-US" dirty="0">
               <a:latin typeface="Segoe UI Light" panose="020B0502040204020203" pitchFamily="34" charset="0"/>
               <a:cs typeface="Segoe UI Light" panose="020B0502040204020203" pitchFamily="34" charset="0"/>
@@ -3568,18 +4027,37 @@
             <p:ph type="ctrTitle"/>
           </p:nvPr>
         </p:nvSpPr>
-        <p:spPr/>
-        <p:txBody>
-          <a:bodyPr/>
-          <a:lstStyle/>
-          <a:p>
-            <a:r>
-              <a:rPr lang="en-US" dirty="0">
-                <a:latin typeface="Segoe UI Light" panose="020B0502040204020203" pitchFamily="34" charset="0"/>
-                <a:cs typeface="Segoe UI Light" panose="020B0502040204020203" pitchFamily="34" charset="0"/>
+        <p:spPr>
+          <a:xfrm>
+            <a:off x="1524000" y="1433528"/>
+            <a:ext cx="9144000" cy="2387600"/>
+          </a:xfrm>
+        </p:spPr>
+        <p:txBody>
+          <a:bodyPr/>
+          <a:lstStyle/>
+          <a:p>
+            <a:r>
+              <a:rPr lang="en-US" dirty="0" smtClean="0">
+                <a:latin typeface="Roboto Light" charset="0"/>
+                <a:ea typeface="Roboto Light" charset="0"/>
+                <a:cs typeface="Roboto Light" charset="0"/>
               </a:rPr>
-              <a:t>&lt;Name of Project&gt;</a:t>
-            </a:r>
+              <a:t>Ros</a:t>
+            </a:r>
+            <a:r>
+              <a:rPr lang="en-US" dirty="0" smtClean="0">
+                <a:latin typeface="Roboto Light" charset="0"/>
+                <a:ea typeface="Roboto Light" charset="0"/>
+                <a:cs typeface="Roboto Light" charset="0"/>
+              </a:rPr>
+              <a:t>épedia</a:t>
+            </a:r>
+            <a:endParaRPr lang="en-US" dirty="0">
+              <a:latin typeface="Roboto Light" charset="0"/>
+              <a:ea typeface="Roboto Light" charset="0"/>
+              <a:cs typeface="Roboto Light" charset="0"/>
+            </a:endParaRPr>
           </a:p>
         </p:txBody>
       </p:sp>
@@ -3593,32 +4071,72 @@
             <p:ph type="subTitle" idx="1"/>
           </p:nvPr>
         </p:nvSpPr>
-        <p:spPr/>
-        <p:txBody>
-          <a:bodyPr/>
-          <a:lstStyle/>
-          <a:p>
-            <a:pPr algn="l"/>
-            <a:r>
-              <a:rPr lang="en-US" dirty="0">
-                <a:latin typeface="Segoe UI Light" panose="020B0502040204020203" pitchFamily="34" charset="0"/>
-                <a:cs typeface="Segoe UI Light" panose="020B0502040204020203" pitchFamily="34" charset="0"/>
+        <p:spPr>
+          <a:xfrm>
+            <a:off x="1524000" y="4355024"/>
+            <a:ext cx="9144000" cy="902776"/>
+          </a:xfrm>
+        </p:spPr>
+        <p:txBody>
+          <a:bodyPr/>
+          <a:lstStyle/>
+          <a:p>
+            <a:r>
+              <a:rPr lang="en-US" dirty="0" smtClean="0">
+                <a:latin typeface="Roboto Thin" charset="0"/>
+                <a:ea typeface="Roboto Thin" charset="0"/>
+                <a:cs typeface="Roboto Thin" charset="0"/>
               </a:rPr>
-              <a:t>&lt;Your Name&gt;</a:t>
-            </a:r>
-          </a:p>
-          <a:p>
-            <a:pPr algn="l"/>
-            <a:r>
-              <a:rPr lang="en-US" dirty="0">
-                <a:latin typeface="Segoe UI Light" panose="020B0502040204020203" pitchFamily="34" charset="0"/>
-                <a:cs typeface="Segoe UI Light" panose="020B0502040204020203" pitchFamily="34" charset="0"/>
+              <a:t>Joshua Fu</a:t>
+            </a:r>
+          </a:p>
+          <a:p>
+            <a:r>
+              <a:rPr lang="en-US" dirty="0" smtClean="0">
+                <a:latin typeface="Roboto Thin" charset="0"/>
+                <a:ea typeface="Roboto Thin" charset="0"/>
+                <a:cs typeface="Roboto Thin" charset="0"/>
               </a:rPr>
-              <a:t>&lt;MSA Email Address&gt;</a:t>
-            </a:r>
-          </a:p>
-        </p:txBody>
-      </p:sp>
+              <a:t>jfu047@aucklanduni.ac.nz</a:t>
+            </a:r>
+            <a:endParaRPr lang="en-US" dirty="0">
+              <a:latin typeface="Roboto Thin" charset="0"/>
+              <a:ea typeface="Roboto Thin" charset="0"/>
+              <a:cs typeface="Roboto Thin" charset="0"/>
+            </a:endParaRPr>
+          </a:p>
+        </p:txBody>
+      </p:sp>
+      <p:pic>
+        <p:nvPicPr>
+          <p:cNvPr id="4" name="Picture 3"/>
+          <p:cNvPicPr>
+            <a:picLocks noChangeAspect="1"/>
+          </p:cNvPicPr>
+          <p:nvPr/>
+        </p:nvPicPr>
+        <p:blipFill>
+          <a:blip r:embed="rId3">
+            <a:extLst>
+              <a:ext uri="{28A0092B-C50C-407E-A947-70E740481C1C}">
+                <a14:useLocalDpi xmlns:a14="http://schemas.microsoft.com/office/drawing/2010/main" val="0"/>
+              </a:ext>
+            </a:extLst>
+          </a:blip>
+          <a:stretch>
+            <a:fillRect/>
+          </a:stretch>
+        </p:blipFill>
+        <p:spPr>
+          <a:xfrm>
+            <a:off x="4803713" y="277302"/>
+            <a:ext cx="2562287" cy="2350026"/>
+          </a:xfrm>
+          <a:prstGeom prst="rect">
+            <a:avLst/>
+          </a:prstGeom>
+        </p:spPr>
+      </p:pic>
     </p:spTree>
     <p:extLst>
       <p:ext uri="{BB962C8B-B14F-4D97-AF65-F5344CB8AC3E}">
@@ -3665,19 +4183,92 @@
           <a:lstStyle/>
           <a:p>
             <a:r>
-              <a:rPr lang="en-US" dirty="0">
-                <a:latin typeface="Segoe UI Light" panose="020B0502040204020203" pitchFamily="34" charset="0"/>
+              <a:rPr lang="en-US" dirty="0" smtClean="0">
+                <a:latin typeface="Roboto Light" charset="0"/>
+                <a:ea typeface="Roboto Light" charset="0"/>
+                <a:cs typeface="Roboto Light" charset="0"/>
+              </a:rPr>
+              <a:t>A bit about myself</a:t>
+            </a:r>
+            <a:endParaRPr lang="en-US" dirty="0">
+              <a:latin typeface="Roboto Light" charset="0"/>
+              <a:ea typeface="Roboto Light" charset="0"/>
+              <a:cs typeface="Roboto Light" charset="0"/>
+            </a:endParaRPr>
+          </a:p>
+        </p:txBody>
+      </p:sp>
+      <p:sp>
+        <p:nvSpPr>
+          <p:cNvPr id="3" name="Subtitle 2"/>
+          <p:cNvSpPr>
+            <a:spLocks noGrp="1"/>
+          </p:cNvSpPr>
+          <p:nvPr>
+            <p:ph idx="1"/>
+          </p:nvPr>
+        </p:nvSpPr>
+        <p:spPr/>
+        <p:txBody>
+          <a:bodyPr/>
+          <a:lstStyle/>
+          <a:p>
+            <a:r>
+              <a:rPr lang="en-US" dirty="0" smtClean="0">
+                <a:latin typeface="+mj-lt"/>
+                <a:ea typeface="Roboto Thin" charset="0"/>
+                <a:cs typeface="Roboto Thin" charset="0"/>
+              </a:rPr>
+              <a:t>Second year Software Engineering student from the University of Auckland</a:t>
+            </a:r>
+            <a:endParaRPr lang="en-US" dirty="0" smtClean="0">
+              <a:latin typeface="+mj-lt"/>
+            </a:endParaRPr>
+          </a:p>
+          <a:p>
+            <a:pPr algn="l"/>
+            <a:r>
+              <a:rPr lang="en-US" dirty="0" smtClean="0">
+                <a:latin typeface="+mj-lt"/>
+              </a:rPr>
+              <a:t>Love to learn </a:t>
+            </a:r>
+          </a:p>
+          <a:p>
+            <a:pPr algn="l"/>
+            <a:r>
+              <a:rPr lang="en-US" dirty="0" smtClean="0">
+                <a:latin typeface="+mj-lt"/>
+              </a:rPr>
+              <a:t>Used to play badminton professionally for Auckland</a:t>
+            </a:r>
+          </a:p>
+          <a:p>
+            <a:pPr algn="l"/>
+            <a:r>
+              <a:rPr lang="en-US" dirty="0" smtClean="0">
+                <a:latin typeface="+mj-lt"/>
                 <a:cs typeface="Segoe UI Light" panose="020B0502040204020203" pitchFamily="34" charset="0"/>
               </a:rPr>
-              <a:t>A bit about yourself </a:t>
-            </a:r>
-            <a:r>
-              <a:rPr lang="en-US" dirty="0">
-                <a:latin typeface="Segoe UI Light" panose="020B0502040204020203" pitchFamily="34" charset="0"/>
-                <a:cs typeface="Segoe UI Light" panose="020B0502040204020203" pitchFamily="34" charset="0"/>
-                <a:sym typeface="Wingdings" panose="05000000000000000000" pitchFamily="2" charset="2"/>
+              <a:t>Small suggestion to MSA</a:t>
+            </a:r>
+          </a:p>
+          <a:p>
+            <a:pPr algn="l"/>
+            <a:r>
+              <a:rPr lang="en-US" dirty="0" smtClean="0">
+                <a:latin typeface="+mj-lt"/>
               </a:rPr>
-              <a:t> </a:t>
+              <a:t>Near-future goal: Create a web app for the family farm</a:t>
+            </a:r>
+          </a:p>
+          <a:p>
+            <a:pPr algn="l"/>
+            <a:r>
+              <a:rPr lang="en-US" dirty="0" smtClean="0">
+                <a:latin typeface="+mj-lt"/>
+              </a:rPr>
+              <a:t>Distance future goal: create a business </a:t>
             </a:r>
             <a:endParaRPr lang="en-US" dirty="0">
               <a:latin typeface="Segoe UI Light" panose="020B0502040204020203" pitchFamily="34" charset="0"/>
@@ -3686,75 +4277,10 @@
           </a:p>
         </p:txBody>
       </p:sp>
-      <p:sp>
-        <p:nvSpPr>
-          <p:cNvPr id="3" name="Subtitle 2"/>
-          <p:cNvSpPr>
-            <a:spLocks noGrp="1"/>
-          </p:cNvSpPr>
-          <p:nvPr>
-            <p:ph idx="1"/>
-          </p:nvPr>
-        </p:nvSpPr>
-        <p:spPr/>
-        <p:txBody>
-          <a:bodyPr/>
-          <a:lstStyle/>
-          <a:p>
-            <a:r>
-              <a:rPr lang="en-US" dirty="0">
-                <a:latin typeface="Segoe UI Light" panose="020B0502040204020203" pitchFamily="34" charset="0"/>
-                <a:cs typeface="Segoe UI Light" panose="020B0502040204020203" pitchFamily="34" charset="0"/>
-              </a:rPr>
-              <a:t>What your interests / hobbies are</a:t>
-            </a:r>
-          </a:p>
-          <a:p>
-            <a:pPr algn="l"/>
-            <a:r>
-              <a:rPr lang="en-US" dirty="0">
-                <a:latin typeface="Segoe UI Light" panose="020B0502040204020203" pitchFamily="34" charset="0"/>
-                <a:cs typeface="Segoe UI Light" panose="020B0502040204020203" pitchFamily="34" charset="0"/>
-              </a:rPr>
-              <a:t>What you are studying</a:t>
-            </a:r>
-          </a:p>
-          <a:p>
-            <a:pPr algn="l"/>
-            <a:r>
-              <a:rPr lang="en-US" dirty="0">
-                <a:latin typeface="Segoe UI Light" panose="020B0502040204020203" pitchFamily="34" charset="0"/>
-                <a:cs typeface="Segoe UI Light" panose="020B0502040204020203" pitchFamily="34" charset="0"/>
-              </a:rPr>
-              <a:t>Best part of MSA</a:t>
-            </a:r>
-          </a:p>
-          <a:p>
-            <a:pPr algn="l"/>
-            <a:r>
-              <a:rPr lang="en-US" dirty="0">
-                <a:latin typeface="Segoe UI Light" panose="020B0502040204020203" pitchFamily="34" charset="0"/>
-                <a:cs typeface="Segoe UI Light" panose="020B0502040204020203" pitchFamily="34" charset="0"/>
-              </a:rPr>
-              <a:t>What we could improve</a:t>
-            </a:r>
-          </a:p>
-          <a:p>
-            <a:pPr algn="l"/>
-            <a:r>
-              <a:rPr lang="en-US" dirty="0">
-                <a:latin typeface="Segoe UI Light" panose="020B0502040204020203" pitchFamily="34" charset="0"/>
-                <a:cs typeface="Segoe UI Light" panose="020B0502040204020203" pitchFamily="34" charset="0"/>
-              </a:rPr>
-              <a:t>Future Goals</a:t>
-            </a:r>
-          </a:p>
-        </p:txBody>
-      </p:sp>
     </p:spTree>
     <p:extLst>
       <p:ext uri="{BB962C8B-B14F-4D97-AF65-F5344CB8AC3E}">
-        <p14:creationId xmlns:p14="http://schemas.microsoft.com/office/powerpoint/2010/main" val="1386450005"/>
+        <p14:creationId xmlns:p14="http://schemas.microsoft.com/office/powerpoint/2010/main" val="2104325880"/>
       </p:ext>
     </p:extLst>
   </p:cSld>
@@ -3797,55 +4323,91 @@
           <a:lstStyle/>
           <a:p>
             <a:r>
-              <a:rPr lang="en-US" dirty="0">
-                <a:latin typeface="Segoe UI Light" panose="020B0502040204020203" pitchFamily="34" charset="0"/>
+              <a:rPr lang="en-US" dirty="0" smtClean="0">
+                <a:latin typeface="Roboto Light" charset="0"/>
+                <a:ea typeface="Roboto Light" charset="0"/>
+                <a:cs typeface="Roboto Light" charset="0"/>
+              </a:rPr>
+              <a:t>User Experience</a:t>
+            </a:r>
+            <a:endParaRPr lang="en-US" dirty="0">
+              <a:latin typeface="Roboto Light" charset="0"/>
+              <a:ea typeface="Roboto Light" charset="0"/>
+              <a:cs typeface="Roboto Light" charset="0"/>
+            </a:endParaRPr>
+          </a:p>
+        </p:txBody>
+      </p:sp>
+      <p:sp>
+        <p:nvSpPr>
+          <p:cNvPr id="3" name="Subtitle 2"/>
+          <p:cNvSpPr>
+            <a:spLocks noGrp="1"/>
+          </p:cNvSpPr>
+          <p:nvPr>
+            <p:ph idx="1"/>
+          </p:nvPr>
+        </p:nvSpPr>
+        <p:spPr/>
+        <p:txBody>
+          <a:bodyPr/>
+          <a:lstStyle/>
+          <a:p>
+            <a:r>
+              <a:rPr lang="en-US" dirty="0" smtClean="0">
+                <a:latin typeface="+mj-lt"/>
+              </a:rPr>
+              <a:t>Use of whitespace, less is more</a:t>
+            </a:r>
+          </a:p>
+          <a:p>
+            <a:r>
+              <a:rPr lang="en-US" dirty="0" smtClean="0">
+                <a:latin typeface="+mj-lt"/>
                 <a:cs typeface="Segoe UI Light" panose="020B0502040204020203" pitchFamily="34" charset="0"/>
               </a:rPr>
-              <a:t>User Experience</a:t>
-            </a:r>
-          </a:p>
-        </p:txBody>
-      </p:sp>
-      <p:sp>
-        <p:nvSpPr>
-          <p:cNvPr id="3" name="Subtitle 2"/>
-          <p:cNvSpPr>
-            <a:spLocks noGrp="1"/>
-          </p:cNvSpPr>
-          <p:nvPr>
-            <p:ph idx="1"/>
-          </p:nvPr>
-        </p:nvSpPr>
-        <p:spPr/>
-        <p:txBody>
-          <a:bodyPr/>
-          <a:lstStyle/>
-          <a:p>
-            <a:r>
-              <a:rPr lang="en-US" dirty="0">
-                <a:latin typeface="Segoe UI Light" panose="020B0502040204020203" pitchFamily="34" charset="0"/>
+              <a:t>Large buttons </a:t>
+            </a:r>
+          </a:p>
+          <a:p>
+            <a:r>
+              <a:rPr lang="en-US" dirty="0" smtClean="0">
+                <a:latin typeface="+mj-lt"/>
+              </a:rPr>
+              <a:t>Custom theme for consistent look and feel</a:t>
+            </a:r>
+            <a:endParaRPr lang="en-US" dirty="0">
+              <a:latin typeface="+mj-lt"/>
+            </a:endParaRPr>
+          </a:p>
+          <a:p>
+            <a:r>
+              <a:rPr lang="en-US" dirty="0" err="1" smtClean="0">
+                <a:latin typeface="+mj-lt"/>
+              </a:rPr>
+              <a:t>ExpansionPanel</a:t>
+            </a:r>
+            <a:endParaRPr lang="en-US" dirty="0" smtClean="0">
+              <a:latin typeface="+mj-lt"/>
+            </a:endParaRPr>
+          </a:p>
+          <a:p>
+            <a:r>
+              <a:rPr lang="en-US" dirty="0" smtClean="0">
+                <a:latin typeface="+mj-lt"/>
                 <a:cs typeface="Segoe UI Light" panose="020B0502040204020203" pitchFamily="34" charset="0"/>
               </a:rPr>
-              <a:t>What you did and why you did it</a:t>
-            </a:r>
-          </a:p>
-          <a:p>
-            <a:r>
-              <a:rPr lang="en-US" dirty="0">
-                <a:latin typeface="Segoe UI Light" panose="020B0502040204020203" pitchFamily="34" charset="0"/>
+              <a:t>Use of contrasting </a:t>
+            </a:r>
+            <a:r>
+              <a:rPr lang="en-US" dirty="0" err="1" smtClean="0">
+                <a:latin typeface="+mj-lt"/>
                 <a:cs typeface="Segoe UI Light" panose="020B0502040204020203" pitchFamily="34" charset="0"/>
               </a:rPr>
-              <a:t>Branding, </a:t>
-            </a:r>
-            <a:r>
-              <a:rPr lang="en-US" dirty="0" err="1">
-                <a:latin typeface="Segoe UI Light" panose="020B0502040204020203" pitchFamily="34" charset="0"/>
-                <a:cs typeface="Segoe UI Light" panose="020B0502040204020203" pitchFamily="34" charset="0"/>
-              </a:rPr>
-              <a:t>etc</a:t>
+              <a:t>colours</a:t>
             </a:r>
             <a:endParaRPr lang="en-US" dirty="0">
-              <a:latin typeface="Segoe UI Light" panose="020B0502040204020203" pitchFamily="34" charset="0"/>
+              <a:latin typeface="+mj-lt"/>
               <a:cs typeface="Segoe UI Light" panose="020B0502040204020203" pitchFamily="34" charset="0"/>
             </a:endParaRPr>
           </a:p>
@@ -3897,69 +4459,110 @@
           <a:lstStyle/>
           <a:p>
             <a:r>
-              <a:rPr lang="en-US" dirty="0"/>
-              <a:t>Databases</a:t>
+              <a:rPr lang="en-US" dirty="0" smtClean="0">
+                <a:latin typeface="Roboto Light" charset="0"/>
+                <a:ea typeface="Roboto Light" charset="0"/>
+                <a:cs typeface="Roboto Light" charset="0"/>
+              </a:rPr>
+              <a:t>Database</a:t>
             </a:r>
             <a:endParaRPr lang="en-US" dirty="0">
-              <a:latin typeface="Segoe UI Light" panose="020B0502040204020203" pitchFamily="34" charset="0"/>
-              <a:cs typeface="Segoe UI Light" panose="020B0502040204020203" pitchFamily="34" charset="0"/>
+              <a:latin typeface="Roboto Light" charset="0"/>
+              <a:ea typeface="Roboto Light" charset="0"/>
+              <a:cs typeface="Roboto Light" charset="0"/>
             </a:endParaRPr>
           </a:p>
         </p:txBody>
       </p:sp>
-      <p:sp>
-        <p:nvSpPr>
-          <p:cNvPr id="3" name="Subtitle 2"/>
-          <p:cNvSpPr>
-            <a:spLocks noGrp="1"/>
-          </p:cNvSpPr>
+      <p:pic>
+        <p:nvPicPr>
+          <p:cNvPr id="6" name="Content Placeholder 5"/>
+          <p:cNvPicPr>
+            <a:picLocks noGrp="1" noChangeAspect="1"/>
+          </p:cNvPicPr>
           <p:nvPr>
             <p:ph idx="1"/>
           </p:nvPr>
-        </p:nvSpPr>
-        <p:spPr/>
-        <p:txBody>
-          <a:bodyPr/>
-          <a:lstStyle/>
-          <a:p>
-            <a:pPr marL="0" indent="0">
-              <a:buNone/>
-            </a:pPr>
-            <a:r>
-              <a:rPr lang="en-US" dirty="0">
-                <a:latin typeface="Segoe UI Light" panose="020B0502040204020203" pitchFamily="34" charset="0"/>
-                <a:cs typeface="Segoe UI Light" panose="020B0502040204020203" pitchFamily="34" charset="0"/>
-              </a:rPr>
-              <a:t>- Your Schema, </a:t>
-            </a:r>
-            <a:r>
-              <a:rPr lang="en-US" dirty="0" err="1">
-                <a:latin typeface="Segoe UI Light" panose="020B0502040204020203" pitchFamily="34" charset="0"/>
-                <a:cs typeface="Segoe UI Light" panose="020B0502040204020203" pitchFamily="34" charset="0"/>
-              </a:rPr>
-              <a:t>EasyTables</a:t>
-            </a:r>
-            <a:r>
-              <a:rPr lang="en-US" dirty="0">
-                <a:latin typeface="Segoe UI Light" panose="020B0502040204020203" pitchFamily="34" charset="0"/>
-                <a:cs typeface="Segoe UI Light" panose="020B0502040204020203" pitchFamily="34" charset="0"/>
-              </a:rPr>
-              <a:t>, </a:t>
-            </a:r>
-            <a:r>
-              <a:rPr lang="en-US" dirty="0" err="1">
-                <a:latin typeface="Segoe UI Light" panose="020B0502040204020203" pitchFamily="34" charset="0"/>
-                <a:cs typeface="Segoe UI Light" panose="020B0502040204020203" pitchFamily="34" charset="0"/>
-              </a:rPr>
-              <a:t>etc</a:t>
-            </a:r>
-            <a:endParaRPr lang="en-US" dirty="0">
-              <a:latin typeface="Segoe UI Light" panose="020B0502040204020203" pitchFamily="34" charset="0"/>
-              <a:cs typeface="Segoe UI Light" panose="020B0502040204020203" pitchFamily="34" charset="0"/>
-            </a:endParaRPr>
-          </a:p>
-        </p:txBody>
-      </p:sp>
+        </p:nvPicPr>
+        <p:blipFill>
+          <a:blip r:embed="rId3">
+            <a:extLst>
+              <a:ext uri="{28A0092B-C50C-407E-A947-70E740481C1C}">
+                <a14:useLocalDpi xmlns:a14="http://schemas.microsoft.com/office/drawing/2010/main" val="0"/>
+              </a:ext>
+            </a:extLst>
+          </a:blip>
+          <a:stretch>
+            <a:fillRect/>
+          </a:stretch>
+        </p:blipFill>
+        <p:spPr>
+          <a:xfrm>
+            <a:off x="795867" y="1690688"/>
+            <a:ext cx="10515600" cy="4272783"/>
+          </a:xfrm>
+        </p:spPr>
+      </p:pic>
+      <p:pic>
+        <p:nvPicPr>
+          <p:cNvPr id="7" name="Picture 6"/>
+          <p:cNvPicPr>
+            <a:picLocks noChangeAspect="1"/>
+          </p:cNvPicPr>
+          <p:nvPr/>
+        </p:nvPicPr>
+        <p:blipFill>
+          <a:blip r:embed="rId4">
+            <a:extLst>
+              <a:ext uri="{28A0092B-C50C-407E-A947-70E740481C1C}">
+                <a14:useLocalDpi xmlns:a14="http://schemas.microsoft.com/office/drawing/2010/main" val="0"/>
+              </a:ext>
+            </a:extLst>
+          </a:blip>
+          <a:stretch>
+            <a:fillRect/>
+          </a:stretch>
+        </p:blipFill>
+        <p:spPr>
+          <a:xfrm>
+            <a:off x="5582055" y="1690689"/>
+            <a:ext cx="5729412" cy="4272782"/>
+          </a:xfrm>
+          <a:prstGeom prst="rect">
+            <a:avLst/>
+          </a:prstGeom>
+        </p:spPr>
+      </p:pic>
+      <p:pic>
+        <p:nvPicPr>
+          <p:cNvPr id="10" name="Picture 9"/>
+          <p:cNvPicPr>
+            <a:picLocks noChangeAspect="1"/>
+          </p:cNvPicPr>
+          <p:nvPr/>
+        </p:nvPicPr>
+        <p:blipFill>
+          <a:blip r:embed="rId5">
+            <a:extLst>
+              <a:ext uri="{28A0092B-C50C-407E-A947-70E740481C1C}">
+                <a14:useLocalDpi xmlns:a14="http://schemas.microsoft.com/office/drawing/2010/main" val="0"/>
+              </a:ext>
+            </a:extLst>
+          </a:blip>
+          <a:stretch>
+            <a:fillRect/>
+          </a:stretch>
+        </p:blipFill>
+        <p:spPr>
+          <a:xfrm>
+            <a:off x="5703376" y="1131889"/>
+            <a:ext cx="5608091" cy="558800"/>
+          </a:xfrm>
+          <a:prstGeom prst="rect">
+            <a:avLst/>
+          </a:prstGeom>
+        </p:spPr>
+      </p:pic>
     </p:spTree>
     <p:extLst>
       <p:ext uri="{BB962C8B-B14F-4D97-AF65-F5344CB8AC3E}">
@@ -3970,6 +4573,13 @@
   <p:clrMapOvr>
     <a:masterClrMapping/>
   </p:clrMapOvr>
+  <p:timing>
+    <p:tnLst>
+      <p:par>
+        <p:cTn id="1" dur="indefinite" restart="never" nodeType="tmRoot"/>
+      </p:par>
+    </p:tnLst>
+  </p:timing>
 </p:sld>
 </file>
 
@@ -4006,12 +4616,17 @@
           <a:lstStyle/>
           <a:p>
             <a:r>
-              <a:rPr lang="en-US" dirty="0"/>
+              <a:rPr lang="en-US" dirty="0" smtClean="0">
+                <a:latin typeface="Roboto Light" charset="0"/>
+                <a:ea typeface="Roboto Light" charset="0"/>
+                <a:cs typeface="Roboto Light" charset="0"/>
+              </a:rPr>
               <a:t>API</a:t>
             </a:r>
             <a:endParaRPr lang="en-US" dirty="0">
-              <a:latin typeface="Segoe UI Light" panose="020B0502040204020203" pitchFamily="34" charset="0"/>
-              <a:cs typeface="Segoe UI Light" panose="020B0502040204020203" pitchFamily="34" charset="0"/>
+              <a:latin typeface="Roboto Light" charset="0"/>
+              <a:ea typeface="Roboto Light" charset="0"/>
+              <a:cs typeface="Roboto Light" charset="0"/>
             </a:endParaRPr>
           </a:p>
         </p:txBody>
@@ -4031,15 +4646,19 @@
           <a:bodyPr/>
           <a:lstStyle/>
           <a:p>
-            <a:pPr marL="0" indent="0">
-              <a:buNone/>
-            </a:pPr>
-            <a:r>
-              <a:rPr lang="en-US" dirty="0">
-                <a:latin typeface="Segoe UI Light" panose="020B0502040204020203" pitchFamily="34" charset="0"/>
-                <a:cs typeface="Segoe UI Light" panose="020B0502040204020203" pitchFamily="34" charset="0"/>
+            <a:r>
+              <a:rPr lang="en-US" dirty="0" smtClean="0">
+                <a:latin typeface="+mj-lt"/>
               </a:rPr>
-              <a:t>What API you used and why. How it integrates with your app</a:t>
+              <a:t>Facebook share, users can share the web app on social media</a:t>
+            </a:r>
+          </a:p>
+          <a:p>
+            <a:r>
+              <a:rPr lang="en-US" dirty="0" smtClean="0">
+                <a:latin typeface="+mj-lt"/>
+              </a:rPr>
+              <a:t>Databank, the backend of Rosépedia</a:t>
             </a:r>
           </a:p>
         </p:txBody>
@@ -4054,6 +4673,13 @@
   <p:clrMapOvr>
     <a:masterClrMapping/>
   </p:clrMapOvr>
+  <p:timing>
+    <p:tnLst>
+      <p:par>
+        <p:cTn id="1" dur="indefinite" restart="never" nodeType="tmRoot"/>
+      </p:par>
+    </p:tnLst>
+  </p:timing>
 </p:sld>
 </file>
 
@@ -4090,35 +4716,55 @@
           <a:lstStyle/>
           <a:p>
             <a:r>
-              <a:rPr lang="en-US" dirty="0">
-                <a:latin typeface="Segoe UI Light" panose="020B0502040204020203" pitchFamily="34" charset="0"/>
+              <a:rPr lang="en-US" dirty="0" smtClean="0">
+                <a:latin typeface="Roboto Light" charset="0"/>
+                <a:ea typeface="Roboto Light" charset="0"/>
+                <a:cs typeface="Roboto Light" charset="0"/>
+              </a:rPr>
+              <a:t>Azure setup</a:t>
+            </a:r>
+            <a:endParaRPr lang="en-US" dirty="0">
+              <a:latin typeface="Roboto Light" charset="0"/>
+              <a:ea typeface="Roboto Light" charset="0"/>
+              <a:cs typeface="Roboto Light" charset="0"/>
+            </a:endParaRPr>
+          </a:p>
+        </p:txBody>
+      </p:sp>
+      <p:sp>
+        <p:nvSpPr>
+          <p:cNvPr id="3" name="Subtitle 2"/>
+          <p:cNvSpPr>
+            <a:spLocks noGrp="1"/>
+          </p:cNvSpPr>
+          <p:nvPr>
+            <p:ph idx="1"/>
+          </p:nvPr>
+        </p:nvSpPr>
+        <p:spPr/>
+        <p:txBody>
+          <a:bodyPr/>
+          <a:lstStyle/>
+          <a:p>
+            <a:r>
+              <a:rPr lang="en-US" dirty="0" smtClean="0">
+                <a:latin typeface="+mj-lt"/>
+              </a:rPr>
+              <a:t>Blob storage</a:t>
+            </a:r>
+          </a:p>
+          <a:p>
+            <a:r>
+              <a:rPr lang="en-US" dirty="0" smtClean="0">
+                <a:latin typeface="+mj-lt"/>
                 <a:cs typeface="Segoe UI Light" panose="020B0502040204020203" pitchFamily="34" charset="0"/>
               </a:rPr>
-              <a:t>Azure Setup</a:t>
-            </a:r>
-          </a:p>
-        </p:txBody>
-      </p:sp>
-      <p:sp>
-        <p:nvSpPr>
-          <p:cNvPr id="3" name="Subtitle 2"/>
-          <p:cNvSpPr>
-            <a:spLocks noGrp="1"/>
-          </p:cNvSpPr>
-          <p:nvPr>
-            <p:ph idx="1"/>
-          </p:nvPr>
-        </p:nvSpPr>
-        <p:spPr/>
-        <p:txBody>
-          <a:bodyPr/>
-          <a:lstStyle/>
-          <a:p>
-            <a:pPr marL="0" indent="0">
-              <a:buNone/>
-            </a:pPr>
+              <a:t>Web app service</a:t>
+            </a:r>
+          </a:p>
+          <a:p>
             <a:endParaRPr lang="en-US" dirty="0">
-              <a:latin typeface="Segoe UI Light" panose="020B0502040204020203" pitchFamily="34" charset="0"/>
+              <a:latin typeface="+mj-lt"/>
               <a:cs typeface="Segoe UI Light" panose="020B0502040204020203" pitchFamily="34" charset="0"/>
             </a:endParaRPr>
           </a:p>
@@ -4170,35 +4816,84 @@
           <a:lstStyle/>
           <a:p>
             <a:r>
-              <a:rPr lang="en-US" dirty="0">
-                <a:latin typeface="Segoe UI Light" panose="020B0502040204020203" pitchFamily="34" charset="0"/>
+              <a:rPr lang="en-US" dirty="0" smtClean="0">
+                <a:latin typeface="Roboto Light" charset="0"/>
+                <a:ea typeface="Roboto Light" charset="0"/>
+                <a:cs typeface="Roboto Light" charset="0"/>
+              </a:rPr>
+              <a:t>Advanced Features</a:t>
+            </a:r>
+            <a:endParaRPr lang="en-US" dirty="0">
+              <a:latin typeface="Roboto Light" charset="0"/>
+              <a:ea typeface="Roboto Light" charset="0"/>
+              <a:cs typeface="Roboto Light" charset="0"/>
+            </a:endParaRPr>
+          </a:p>
+        </p:txBody>
+      </p:sp>
+      <p:sp>
+        <p:nvSpPr>
+          <p:cNvPr id="3" name="Subtitle 2"/>
+          <p:cNvSpPr>
+            <a:spLocks noGrp="1"/>
+          </p:cNvSpPr>
+          <p:nvPr>
+            <p:ph idx="1"/>
+          </p:nvPr>
+        </p:nvSpPr>
+        <p:spPr/>
+        <p:txBody>
+          <a:bodyPr/>
+          <a:lstStyle/>
+          <a:p>
+            <a:r>
+              <a:rPr lang="en-US" dirty="0" smtClean="0">
+                <a:latin typeface="+mj-lt"/>
                 <a:cs typeface="Segoe UI Light" panose="020B0502040204020203" pitchFamily="34" charset="0"/>
               </a:rPr>
-              <a:t>Advanced Features</a:t>
-            </a:r>
-          </a:p>
-        </p:txBody>
-      </p:sp>
-      <p:sp>
-        <p:nvSpPr>
-          <p:cNvPr id="3" name="Subtitle 2"/>
-          <p:cNvSpPr>
-            <a:spLocks noGrp="1"/>
-          </p:cNvSpPr>
-          <p:nvPr>
-            <p:ph idx="1"/>
-          </p:nvPr>
-        </p:nvSpPr>
-        <p:spPr/>
-        <p:txBody>
-          <a:bodyPr/>
-          <a:lstStyle/>
-          <a:p>
-            <a:pPr marL="0" indent="0">
-              <a:buNone/>
-            </a:pPr>
+              <a:t>Facial authent</a:t>
+            </a:r>
+            <a:r>
+              <a:rPr lang="en-US" dirty="0" smtClean="0">
+                <a:latin typeface="+mj-lt"/>
+              </a:rPr>
+              <a:t>ication</a:t>
+            </a:r>
+          </a:p>
+          <a:p>
+            <a:r>
+              <a:rPr lang="en-US" dirty="0" smtClean="0">
+                <a:latin typeface="+mj-lt"/>
+              </a:rPr>
+              <a:t>Automated assistance</a:t>
+            </a:r>
+          </a:p>
+          <a:p>
+            <a:r>
+              <a:rPr lang="en-US" dirty="0" smtClean="0">
+                <a:latin typeface="+mj-lt"/>
+              </a:rPr>
+              <a:t>Accessibility </a:t>
+            </a:r>
+          </a:p>
+          <a:p>
+            <a:r>
+              <a:rPr lang="en-US" dirty="0" smtClean="0">
+                <a:latin typeface="+mj-lt"/>
+              </a:rPr>
+              <a:t>Social media integration</a:t>
+            </a:r>
+          </a:p>
+          <a:p>
+            <a:r>
+              <a:rPr lang="en-US" dirty="0" smtClean="0">
+                <a:latin typeface="+mj-lt"/>
+                <a:cs typeface="Segoe UI Light" panose="020B0502040204020203" pitchFamily="34" charset="0"/>
+              </a:rPr>
+              <a:t>Custom theme complete with favicon and logo</a:t>
+            </a:r>
             <a:endParaRPr lang="en-US" dirty="0">
-              <a:latin typeface="Segoe UI Light" panose="020B0502040204020203" pitchFamily="34" charset="0"/>
+              <a:latin typeface="+mj-lt"/>
               <a:cs typeface="Segoe UI Light" panose="020B0502040204020203" pitchFamily="34" charset="0"/>
             </a:endParaRPr>
           </a:p>
@@ -4250,12 +4945,18 @@
           <a:lstStyle/>
           <a:p>
             <a:r>
-              <a:rPr lang="en-US" dirty="0">
-                <a:latin typeface="Segoe UI Light" panose="020B0502040204020203" pitchFamily="34" charset="0"/>
-                <a:cs typeface="Segoe UI Light" panose="020B0502040204020203" pitchFamily="34" charset="0"/>
+              <a:rPr lang="en-US" dirty="0" smtClean="0">
+                <a:latin typeface="Roboto Light" charset="0"/>
+                <a:ea typeface="Roboto Light" charset="0"/>
+                <a:cs typeface="Roboto Light" charset="0"/>
               </a:rPr>
               <a:t>Advanced Considerations</a:t>
             </a:r>
+            <a:endParaRPr lang="en-US" dirty="0">
+              <a:latin typeface="Roboto Light" charset="0"/>
+              <a:ea typeface="Roboto Light" charset="0"/>
+              <a:cs typeface="Roboto Light" charset="0"/>
+            </a:endParaRPr>
           </a:p>
         </p:txBody>
       </p:sp>
@@ -4273,13 +4974,43 @@
         <p:txBody>
           <a:bodyPr/>
           <a:lstStyle/>
+          <a:p>
+            <a:r>
+              <a:rPr lang="en-US" dirty="0" smtClean="0">
+                <a:latin typeface="+mj-lt"/>
+              </a:rPr>
+              <a:t>Speech to text</a:t>
+            </a:r>
+          </a:p>
+          <a:p>
+            <a:r>
+              <a:rPr lang="en-US" dirty="0" smtClean="0">
+                <a:latin typeface="+mj-lt"/>
+              </a:rPr>
+              <a:t>App Insight</a:t>
+            </a:r>
+          </a:p>
+          <a:p>
+            <a:r>
+              <a:rPr lang="en-US" dirty="0" smtClean="0">
+                <a:latin typeface="+mj-lt"/>
+              </a:rPr>
+              <a:t>Testing</a:t>
+            </a:r>
+          </a:p>
+          <a:p>
+            <a:endParaRPr lang="en-US" dirty="0">
+              <a:latin typeface="+mj-lt"/>
+            </a:endParaRPr>
+          </a:p>
           <a:p>
             <a:pPr marL="0" indent="0">
               <a:buNone/>
             </a:pPr>
             <a:endParaRPr lang="en-US" dirty="0">
-              <a:latin typeface="Segoe UI Light" panose="020B0502040204020203" pitchFamily="34" charset="0"/>
-              <a:cs typeface="Segoe UI Light" panose="020B0502040204020203" pitchFamily="34" charset="0"/>
+              <a:latin typeface="Roboto Light" charset="0"/>
+              <a:ea typeface="Roboto Light" charset="0"/>
+              <a:cs typeface="Roboto Light" charset="0"/>
             </a:endParaRPr>
           </a:p>
         </p:txBody>

</xml_diff>